<commit_message>
Small fix in slides
</commit_message>
<xml_diff>
--- a/Lectures/Verification-and-Validation/vav_crossvalidation.pptx
+++ b/Lectures/Verification-and-Validation/vav_crossvalidation.pptx
@@ -260,7 +260,7 @@
       </p15:sldGuideLst>
     </p:ext>
     <p:ext uri="http://customooxmlschemas.google.com/">
-      <go:slidesCustomData xmlns="" xmlns:mc="http://schemas.openxmlformats.org/markup-compatibility/2006" xmlns:mv="urn:schemas-microsoft-com:mac:vml" xmlns:c="http://schemas.openxmlformats.org/drawingml/2006/chart" xmlns:dgm="http://schemas.openxmlformats.org/drawingml/2006/diagram" xmlns:o="urn:schemas-microsoft-com:office:office" xmlns:v="urn:schemas-microsoft-com:vml" xmlns:pvml="urn:schemas-microsoft-com:office:powerpoint" xmlns:com="http://schemas.openxmlformats.org/drawingml/2006/compatibility" xmlns:p14="http://schemas.microsoft.com/office/powerpoint/2010/main" xmlns:p15="http://schemas.microsoft.com/office/powerpoint/2012/main" xmlns:ahyp="http://schemas.microsoft.com/office/drawing/2018/hyperlinkcolor" xmlns:go="http://customooxmlschemas.google.com/" r:id="rId12" roundtripDataSignature="AMtx7mjl+aSCetQPFS4P1Z6jGd+riU4YTw=="/>
+      <go:slidesCustomData xmlns:go="http://customooxmlschemas.google.com/" xmlns:ahyp="http://schemas.microsoft.com/office/drawing/2018/hyperlinkcolor" xmlns:p15="http://schemas.microsoft.com/office/powerpoint/2012/main" xmlns:p14="http://schemas.microsoft.com/office/powerpoint/2010/main" xmlns:com="http://schemas.openxmlformats.org/drawingml/2006/compatibility" xmlns:pvml="urn:schemas-microsoft-com:office:powerpoint" xmlns:v="urn:schemas-microsoft-com:vml" xmlns:o="urn:schemas-microsoft-com:office:office" xmlns:dgm="http://schemas.openxmlformats.org/drawingml/2006/diagram" xmlns:c="http://schemas.openxmlformats.org/drawingml/2006/chart" xmlns:mv="urn:schemas-microsoft-com:mac:vml" xmlns:mc="http://schemas.openxmlformats.org/markup-compatibility/2006" xmlns="" r:id="rId12" roundtripDataSignature="AMtx7mjl+aSCetQPFS4P1Z6jGd+riU4YTw=="/>
     </p:ext>
   </p:extLst>
 </p:presentation>
@@ -23109,7 +23109,7 @@
         </p:nvSpPr>
         <p:spPr>
           <a:xfrm>
-            <a:off x="4664377" y="1557270"/>
+            <a:off x="4664377" y="1588800"/>
             <a:ext cx="684803" cy="369332"/>
           </a:xfrm>
           <a:prstGeom prst="rect">
@@ -23599,1102 +23599,1212 @@
           </p:txBody>
         </p:sp>
       </p:grpSp>
-      <p:grpSp>
-        <p:nvGrpSpPr>
-          <p:cNvPr id="10" name="Group 9">
+      <p:graphicFrame>
+        <p:nvGraphicFramePr>
+          <p:cNvPr id="172" name="Google Shape;172;p8"/>
+          <p:cNvGraphicFramePr/>
+          <p:nvPr>
+            <p:extLst>
+              <p:ext uri="{D42A27DB-BD31-4B8C-83A1-F6EECF244321}">
+                <p14:modId xmlns:p14="http://schemas.microsoft.com/office/powerpoint/2010/main" val="589864210"/>
+              </p:ext>
+            </p:extLst>
+          </p:nvPr>
+        </p:nvGraphicFramePr>
+        <p:xfrm>
+          <a:off x="4572000" y="838200"/>
+          <a:ext cx="833200" cy="817950"/>
+        </p:xfrm>
+        <a:graphic>
+          <a:graphicData uri="http://schemas.openxmlformats.org/drawingml/2006/table">
+            <a:tbl>
+              <a:tblPr firstRow="1" bandRow="1">
+                <a:noFill/>
+                <a:tableStyleId>{12AFE262-C695-4DD4-B80E-62B22C3FB715}</a:tableStyleId>
+              </a:tblPr>
+              <a:tblGrid>
+                <a:gridCol w="208300">
+                  <a:extLst>
+                    <a:ext uri="{9D8B030D-6E8A-4147-A177-3AD203B41FA5}">
+                      <a16:colId xmlns:a16="http://schemas.microsoft.com/office/drawing/2014/main" val="20000"/>
+                    </a:ext>
+                  </a:extLst>
+                </a:gridCol>
+                <a:gridCol w="208300">
+                  <a:extLst>
+                    <a:ext uri="{9D8B030D-6E8A-4147-A177-3AD203B41FA5}">
+                      <a16:colId xmlns:a16="http://schemas.microsoft.com/office/drawing/2014/main" val="20001"/>
+                    </a:ext>
+                  </a:extLst>
+                </a:gridCol>
+                <a:gridCol w="208300">
+                  <a:extLst>
+                    <a:ext uri="{9D8B030D-6E8A-4147-A177-3AD203B41FA5}">
+                      <a16:colId xmlns:a16="http://schemas.microsoft.com/office/drawing/2014/main" val="20002"/>
+                    </a:ext>
+                  </a:extLst>
+                </a:gridCol>
+                <a:gridCol w="208300">
+                  <a:extLst>
+                    <a:ext uri="{9D8B030D-6E8A-4147-A177-3AD203B41FA5}">
+                      <a16:colId xmlns:a16="http://schemas.microsoft.com/office/drawing/2014/main" val="20003"/>
+                    </a:ext>
+                  </a:extLst>
+                </a:gridCol>
+              </a:tblGrid>
+              <a:tr h="0">
+                <a:tc>
+                  <a:txBody>
+                    <a:bodyPr/>
+                    <a:lstStyle/>
+                    <a:p>
+                      <a:pPr marL="0" marR="0" lvl="0" indent="0" algn="l" rtl="0">
+                        <a:lnSpc>
+                          <a:spcPct val="100000"/>
+                        </a:lnSpc>
+                        <a:spcBef>
+                          <a:spcPts val="0"/>
+                        </a:spcBef>
+                        <a:spcAft>
+                          <a:spcPts val="0"/>
+                        </a:spcAft>
+                        <a:buClr>
+                          <a:srgbClr val="000000"/>
+                        </a:buClr>
+                        <a:buSzPts val="100"/>
+                        <a:buFont typeface="Arial"/>
+                        <a:buNone/>
+                      </a:pPr>
+                      <a:endParaRPr sz="100" u="none" strike="noStrike" cap="none">
+                        <a:solidFill>
+                          <a:srgbClr val="002060"/>
+                        </a:solidFill>
+                        <a:highlight>
+                          <a:srgbClr val="0000FF"/>
+                        </a:highlight>
+                      </a:endParaRPr>
+                    </a:p>
+                  </a:txBody>
+                  <a:tcPr marL="91450" marR="91450" marT="45725" marB="45725">
+                    <a:solidFill>
+                      <a:srgbClr val="D8D8D8"/>
+                    </a:solidFill>
+                  </a:tcPr>
+                </a:tc>
+                <a:tc>
+                  <a:txBody>
+                    <a:bodyPr/>
+                    <a:lstStyle/>
+                    <a:p>
+                      <a:pPr marL="0" marR="0" lvl="0" indent="0" algn="l" rtl="0">
+                        <a:lnSpc>
+                          <a:spcPct val="100000"/>
+                        </a:lnSpc>
+                        <a:spcBef>
+                          <a:spcPts val="0"/>
+                        </a:spcBef>
+                        <a:spcAft>
+                          <a:spcPts val="0"/>
+                        </a:spcAft>
+                        <a:buClr>
+                          <a:srgbClr val="000000"/>
+                        </a:buClr>
+                        <a:buSzPts val="100"/>
+                        <a:buFont typeface="Arial"/>
+                        <a:buNone/>
+                      </a:pPr>
+                      <a:endParaRPr sz="100" u="none" strike="noStrike" cap="none">
+                        <a:solidFill>
+                          <a:srgbClr val="002060"/>
+                        </a:solidFill>
+                        <a:highlight>
+                          <a:srgbClr val="0000FF"/>
+                        </a:highlight>
+                      </a:endParaRPr>
+                    </a:p>
+                  </a:txBody>
+                  <a:tcPr marL="91450" marR="91450" marT="45725" marB="45725">
+                    <a:solidFill>
+                      <a:srgbClr val="D8D8D8"/>
+                    </a:solidFill>
+                  </a:tcPr>
+                </a:tc>
+                <a:tc>
+                  <a:txBody>
+                    <a:bodyPr/>
+                    <a:lstStyle/>
+                    <a:p>
+                      <a:pPr marL="0" marR="0" lvl="0" indent="0" algn="l" rtl="0">
+                        <a:lnSpc>
+                          <a:spcPct val="100000"/>
+                        </a:lnSpc>
+                        <a:spcBef>
+                          <a:spcPts val="0"/>
+                        </a:spcBef>
+                        <a:spcAft>
+                          <a:spcPts val="0"/>
+                        </a:spcAft>
+                        <a:buClr>
+                          <a:srgbClr val="000000"/>
+                        </a:buClr>
+                        <a:buSzPts val="100"/>
+                        <a:buFont typeface="Arial"/>
+                        <a:buNone/>
+                      </a:pPr>
+                      <a:endParaRPr sz="100" u="none" strike="noStrike" cap="none">
+                        <a:solidFill>
+                          <a:srgbClr val="002060"/>
+                        </a:solidFill>
+                        <a:highlight>
+                          <a:srgbClr val="0000FF"/>
+                        </a:highlight>
+                      </a:endParaRPr>
+                    </a:p>
+                  </a:txBody>
+                  <a:tcPr marL="91450" marR="91450" marT="45725" marB="45725">
+                    <a:solidFill>
+                      <a:srgbClr val="D8D8D8"/>
+                    </a:solidFill>
+                  </a:tcPr>
+                </a:tc>
+                <a:tc>
+                  <a:txBody>
+                    <a:bodyPr/>
+                    <a:lstStyle/>
+                    <a:p>
+                      <a:pPr marL="0" marR="0" lvl="0" indent="0" algn="l" rtl="0">
+                        <a:lnSpc>
+                          <a:spcPct val="100000"/>
+                        </a:lnSpc>
+                        <a:spcBef>
+                          <a:spcPts val="0"/>
+                        </a:spcBef>
+                        <a:spcAft>
+                          <a:spcPts val="0"/>
+                        </a:spcAft>
+                        <a:buClr>
+                          <a:srgbClr val="000000"/>
+                        </a:buClr>
+                        <a:buSzPts val="100"/>
+                        <a:buFont typeface="Arial"/>
+                        <a:buNone/>
+                      </a:pPr>
+                      <a:endParaRPr sz="100" u="none" strike="noStrike" cap="none">
+                        <a:solidFill>
+                          <a:srgbClr val="002060"/>
+                        </a:solidFill>
+                        <a:highlight>
+                          <a:srgbClr val="0000FF"/>
+                        </a:highlight>
+                      </a:endParaRPr>
+                    </a:p>
+                  </a:txBody>
+                  <a:tcPr marL="91450" marR="91450" marT="45725" marB="45725">
+                    <a:solidFill>
+                      <a:srgbClr val="D8D8D8"/>
+                    </a:solidFill>
+                  </a:tcPr>
+                </a:tc>
+                <a:extLst>
+                  <a:ext uri="{0D108BD9-81ED-4DB2-BD59-A6C34878D82A}">
+                    <a16:rowId xmlns:a16="http://schemas.microsoft.com/office/drawing/2014/main" val="10000"/>
+                  </a:ext>
+                </a:extLst>
+              </a:tr>
+              <a:tr h="0">
+                <a:tc>
+                  <a:txBody>
+                    <a:bodyPr/>
+                    <a:lstStyle/>
+                    <a:p>
+                      <a:pPr marL="0" marR="0" lvl="0" indent="0" algn="l" rtl="0">
+                        <a:lnSpc>
+                          <a:spcPct val="100000"/>
+                        </a:lnSpc>
+                        <a:spcBef>
+                          <a:spcPts val="0"/>
+                        </a:spcBef>
+                        <a:spcAft>
+                          <a:spcPts val="0"/>
+                        </a:spcAft>
+                        <a:buClr>
+                          <a:srgbClr val="000000"/>
+                        </a:buClr>
+                        <a:buSzPts val="100"/>
+                        <a:buFont typeface="Arial"/>
+                        <a:buNone/>
+                      </a:pPr>
+                      <a:endParaRPr sz="100" u="none" strike="noStrike" cap="none">
+                        <a:solidFill>
+                          <a:srgbClr val="002060"/>
+                        </a:solidFill>
+                        <a:highlight>
+                          <a:srgbClr val="0000FF"/>
+                        </a:highlight>
+                      </a:endParaRPr>
+                    </a:p>
+                  </a:txBody>
+                  <a:tcPr marL="91450" marR="91450" marT="45725" marB="45725">
+                    <a:solidFill>
+                      <a:srgbClr val="D8D8D8"/>
+                    </a:solidFill>
+                  </a:tcPr>
+                </a:tc>
+                <a:tc>
+                  <a:txBody>
+                    <a:bodyPr/>
+                    <a:lstStyle/>
+                    <a:p>
+                      <a:pPr marL="0" marR="0" lvl="0" indent="0" algn="l" rtl="0">
+                        <a:lnSpc>
+                          <a:spcPct val="100000"/>
+                        </a:lnSpc>
+                        <a:spcBef>
+                          <a:spcPts val="0"/>
+                        </a:spcBef>
+                        <a:spcAft>
+                          <a:spcPts val="0"/>
+                        </a:spcAft>
+                        <a:buClr>
+                          <a:srgbClr val="000000"/>
+                        </a:buClr>
+                        <a:buSzPts val="100"/>
+                        <a:buFont typeface="Arial"/>
+                        <a:buNone/>
+                      </a:pPr>
+                      <a:endParaRPr sz="100" u="none" strike="noStrike" cap="none">
+                        <a:solidFill>
+                          <a:srgbClr val="002060"/>
+                        </a:solidFill>
+                        <a:highlight>
+                          <a:srgbClr val="0000FF"/>
+                        </a:highlight>
+                      </a:endParaRPr>
+                    </a:p>
+                  </a:txBody>
+                  <a:tcPr marL="91450" marR="91450" marT="45725" marB="45725">
+                    <a:solidFill>
+                      <a:srgbClr val="D8D8D8"/>
+                    </a:solidFill>
+                  </a:tcPr>
+                </a:tc>
+                <a:tc>
+                  <a:txBody>
+                    <a:bodyPr/>
+                    <a:lstStyle/>
+                    <a:p>
+                      <a:pPr marL="0" marR="0" lvl="0" indent="0" algn="l" rtl="0">
+                        <a:lnSpc>
+                          <a:spcPct val="100000"/>
+                        </a:lnSpc>
+                        <a:spcBef>
+                          <a:spcPts val="0"/>
+                        </a:spcBef>
+                        <a:spcAft>
+                          <a:spcPts val="0"/>
+                        </a:spcAft>
+                        <a:buClr>
+                          <a:srgbClr val="000000"/>
+                        </a:buClr>
+                        <a:buSzPts val="100"/>
+                        <a:buFont typeface="Arial"/>
+                        <a:buNone/>
+                      </a:pPr>
+                      <a:endParaRPr sz="100" u="none" strike="noStrike" cap="none">
+                        <a:solidFill>
+                          <a:srgbClr val="002060"/>
+                        </a:solidFill>
+                        <a:highlight>
+                          <a:srgbClr val="0000FF"/>
+                        </a:highlight>
+                      </a:endParaRPr>
+                    </a:p>
+                  </a:txBody>
+                  <a:tcPr marL="91450" marR="91450" marT="45725" marB="45725">
+                    <a:solidFill>
+                      <a:srgbClr val="D8D8D8"/>
+                    </a:solidFill>
+                  </a:tcPr>
+                </a:tc>
+                <a:tc>
+                  <a:txBody>
+                    <a:bodyPr/>
+                    <a:lstStyle/>
+                    <a:p>
+                      <a:pPr marL="0" marR="0" lvl="0" indent="0" algn="l" rtl="0">
+                        <a:lnSpc>
+                          <a:spcPct val="100000"/>
+                        </a:lnSpc>
+                        <a:spcBef>
+                          <a:spcPts val="0"/>
+                        </a:spcBef>
+                        <a:spcAft>
+                          <a:spcPts val="0"/>
+                        </a:spcAft>
+                        <a:buClr>
+                          <a:srgbClr val="000000"/>
+                        </a:buClr>
+                        <a:buSzPts val="100"/>
+                        <a:buFont typeface="Arial"/>
+                        <a:buNone/>
+                      </a:pPr>
+                      <a:endParaRPr sz="100" u="none" strike="noStrike" cap="none">
+                        <a:solidFill>
+                          <a:srgbClr val="002060"/>
+                        </a:solidFill>
+                        <a:highlight>
+                          <a:srgbClr val="0000FF"/>
+                        </a:highlight>
+                      </a:endParaRPr>
+                    </a:p>
+                  </a:txBody>
+                  <a:tcPr marL="91450" marR="91450" marT="45725" marB="45725">
+                    <a:solidFill>
+                      <a:srgbClr val="D8D8D8"/>
+                    </a:solidFill>
+                  </a:tcPr>
+                </a:tc>
+                <a:extLst>
+                  <a:ext uri="{0D108BD9-81ED-4DB2-BD59-A6C34878D82A}">
+                    <a16:rowId xmlns:a16="http://schemas.microsoft.com/office/drawing/2014/main" val="10001"/>
+                  </a:ext>
+                </a:extLst>
+              </a:tr>
+              <a:tr h="0">
+                <a:tc>
+                  <a:txBody>
+                    <a:bodyPr/>
+                    <a:lstStyle/>
+                    <a:p>
+                      <a:pPr marL="0" marR="0" lvl="0" indent="0" algn="l" rtl="0">
+                        <a:lnSpc>
+                          <a:spcPct val="100000"/>
+                        </a:lnSpc>
+                        <a:spcBef>
+                          <a:spcPts val="0"/>
+                        </a:spcBef>
+                        <a:spcAft>
+                          <a:spcPts val="0"/>
+                        </a:spcAft>
+                        <a:buClr>
+                          <a:srgbClr val="000000"/>
+                        </a:buClr>
+                        <a:buSzPts val="100"/>
+                        <a:buFont typeface="Arial"/>
+                        <a:buNone/>
+                      </a:pPr>
+                      <a:endParaRPr sz="100" u="none" strike="noStrike" cap="none"/>
+                    </a:p>
+                  </a:txBody>
+                  <a:tcPr marL="91450" marR="91450" marT="45725" marB="45725">
+                    <a:solidFill>
+                      <a:srgbClr val="D8D8D8"/>
+                    </a:solidFill>
+                  </a:tcPr>
+                </a:tc>
+                <a:tc>
+                  <a:txBody>
+                    <a:bodyPr/>
+                    <a:lstStyle/>
+                    <a:p>
+                      <a:pPr marL="0" marR="0" lvl="0" indent="0" algn="l" rtl="0">
+                        <a:lnSpc>
+                          <a:spcPct val="100000"/>
+                        </a:lnSpc>
+                        <a:spcBef>
+                          <a:spcPts val="0"/>
+                        </a:spcBef>
+                        <a:spcAft>
+                          <a:spcPts val="0"/>
+                        </a:spcAft>
+                        <a:buClr>
+                          <a:srgbClr val="000000"/>
+                        </a:buClr>
+                        <a:buSzPts val="100"/>
+                        <a:buFont typeface="Arial"/>
+                        <a:buNone/>
+                      </a:pPr>
+                      <a:endParaRPr sz="100" u="none" strike="noStrike" cap="none"/>
+                    </a:p>
+                  </a:txBody>
+                  <a:tcPr marL="91450" marR="91450" marT="45725" marB="45725">
+                    <a:solidFill>
+                      <a:srgbClr val="D8D8D8"/>
+                    </a:solidFill>
+                  </a:tcPr>
+                </a:tc>
+                <a:tc>
+                  <a:txBody>
+                    <a:bodyPr/>
+                    <a:lstStyle/>
+                    <a:p>
+                      <a:pPr marL="0" marR="0" lvl="0" indent="0" algn="l" rtl="0">
+                        <a:lnSpc>
+                          <a:spcPct val="100000"/>
+                        </a:lnSpc>
+                        <a:spcBef>
+                          <a:spcPts val="0"/>
+                        </a:spcBef>
+                        <a:spcAft>
+                          <a:spcPts val="0"/>
+                        </a:spcAft>
+                        <a:buClr>
+                          <a:srgbClr val="000000"/>
+                        </a:buClr>
+                        <a:buSzPts val="100"/>
+                        <a:buFont typeface="Arial"/>
+                        <a:buNone/>
+                      </a:pPr>
+                      <a:endParaRPr sz="100" u="none" strike="noStrike" cap="none"/>
+                    </a:p>
+                  </a:txBody>
+                  <a:tcPr marL="91450" marR="91450" marT="45725" marB="45725">
+                    <a:solidFill>
+                      <a:srgbClr val="D8D8D8"/>
+                    </a:solidFill>
+                  </a:tcPr>
+                </a:tc>
+                <a:tc>
+                  <a:txBody>
+                    <a:bodyPr/>
+                    <a:lstStyle/>
+                    <a:p>
+                      <a:pPr marL="0" marR="0" lvl="0" indent="0" algn="l" rtl="0">
+                        <a:lnSpc>
+                          <a:spcPct val="100000"/>
+                        </a:lnSpc>
+                        <a:spcBef>
+                          <a:spcPts val="0"/>
+                        </a:spcBef>
+                        <a:spcAft>
+                          <a:spcPts val="0"/>
+                        </a:spcAft>
+                        <a:buClr>
+                          <a:srgbClr val="000000"/>
+                        </a:buClr>
+                        <a:buSzPts val="100"/>
+                        <a:buFont typeface="Arial"/>
+                        <a:buNone/>
+                      </a:pPr>
+                      <a:endParaRPr sz="100" u="none" strike="noStrike" cap="none"/>
+                    </a:p>
+                  </a:txBody>
+                  <a:tcPr marL="91450" marR="91450" marT="45725" marB="45725">
+                    <a:solidFill>
+                      <a:srgbClr val="D8D8D8"/>
+                    </a:solidFill>
+                  </a:tcPr>
+                </a:tc>
+                <a:extLst>
+                  <a:ext uri="{0D108BD9-81ED-4DB2-BD59-A6C34878D82A}">
+                    <a16:rowId xmlns:a16="http://schemas.microsoft.com/office/drawing/2014/main" val="10002"/>
+                  </a:ext>
+                </a:extLst>
+              </a:tr>
+              <a:tr h="0">
+                <a:tc>
+                  <a:txBody>
+                    <a:bodyPr/>
+                    <a:lstStyle/>
+                    <a:p>
+                      <a:pPr marL="0" marR="0" lvl="0" indent="0" algn="l" rtl="0">
+                        <a:lnSpc>
+                          <a:spcPct val="100000"/>
+                        </a:lnSpc>
+                        <a:spcBef>
+                          <a:spcPts val="0"/>
+                        </a:spcBef>
+                        <a:spcAft>
+                          <a:spcPts val="0"/>
+                        </a:spcAft>
+                        <a:buClr>
+                          <a:srgbClr val="000000"/>
+                        </a:buClr>
+                        <a:buSzPts val="100"/>
+                        <a:buFont typeface="Arial"/>
+                        <a:buNone/>
+                      </a:pPr>
+                      <a:endParaRPr sz="100" u="none" strike="noStrike" cap="none"/>
+                    </a:p>
+                  </a:txBody>
+                  <a:tcPr marL="91450" marR="91450" marT="45725" marB="45725">
+                    <a:solidFill>
+                      <a:srgbClr val="D8D8D8"/>
+                    </a:solidFill>
+                  </a:tcPr>
+                </a:tc>
+                <a:tc>
+                  <a:txBody>
+                    <a:bodyPr/>
+                    <a:lstStyle/>
+                    <a:p>
+                      <a:pPr marL="0" marR="0" lvl="0" indent="0" algn="l" rtl="0">
+                        <a:lnSpc>
+                          <a:spcPct val="100000"/>
+                        </a:lnSpc>
+                        <a:spcBef>
+                          <a:spcPts val="0"/>
+                        </a:spcBef>
+                        <a:spcAft>
+                          <a:spcPts val="0"/>
+                        </a:spcAft>
+                        <a:buClr>
+                          <a:srgbClr val="000000"/>
+                        </a:buClr>
+                        <a:buSzPts val="100"/>
+                        <a:buFont typeface="Arial"/>
+                        <a:buNone/>
+                      </a:pPr>
+                      <a:endParaRPr sz="100" u="none" strike="noStrike" cap="none" dirty="0"/>
+                    </a:p>
+                  </a:txBody>
+                  <a:tcPr marL="91450" marR="91450" marT="45725" marB="45725">
+                    <a:solidFill>
+                      <a:srgbClr val="D8D8D8"/>
+                    </a:solidFill>
+                  </a:tcPr>
+                </a:tc>
+                <a:tc>
+                  <a:txBody>
+                    <a:bodyPr/>
+                    <a:lstStyle/>
+                    <a:p>
+                      <a:pPr marL="0" marR="0" lvl="0" indent="0" algn="l" rtl="0">
+                        <a:lnSpc>
+                          <a:spcPct val="100000"/>
+                        </a:lnSpc>
+                        <a:spcBef>
+                          <a:spcPts val="0"/>
+                        </a:spcBef>
+                        <a:spcAft>
+                          <a:spcPts val="0"/>
+                        </a:spcAft>
+                        <a:buClr>
+                          <a:srgbClr val="000000"/>
+                        </a:buClr>
+                        <a:buSzPts val="100"/>
+                        <a:buFont typeface="Arial"/>
+                        <a:buNone/>
+                      </a:pPr>
+                      <a:endParaRPr sz="100" u="none" strike="noStrike" cap="none"/>
+                    </a:p>
+                  </a:txBody>
+                  <a:tcPr marL="91450" marR="91450" marT="45725" marB="45725">
+                    <a:solidFill>
+                      <a:srgbClr val="D8D8D8"/>
+                    </a:solidFill>
+                  </a:tcPr>
+                </a:tc>
+                <a:tc>
+                  <a:txBody>
+                    <a:bodyPr/>
+                    <a:lstStyle/>
+                    <a:p>
+                      <a:pPr marL="0" marR="0" lvl="0" indent="0" algn="l" rtl="0">
+                        <a:lnSpc>
+                          <a:spcPct val="100000"/>
+                        </a:lnSpc>
+                        <a:spcBef>
+                          <a:spcPts val="0"/>
+                        </a:spcBef>
+                        <a:spcAft>
+                          <a:spcPts val="0"/>
+                        </a:spcAft>
+                        <a:buClr>
+                          <a:srgbClr val="000000"/>
+                        </a:buClr>
+                        <a:buSzPts val="100"/>
+                        <a:buFont typeface="Arial"/>
+                        <a:buNone/>
+                      </a:pPr>
+                      <a:endParaRPr sz="100" u="none" strike="noStrike" cap="none"/>
+                    </a:p>
+                  </a:txBody>
+                  <a:tcPr marL="91450" marR="91450" marT="45725" marB="45725">
+                    <a:solidFill>
+                      <a:srgbClr val="D8D8D8"/>
+                    </a:solidFill>
+                  </a:tcPr>
+                </a:tc>
+                <a:extLst>
+                  <a:ext uri="{0D108BD9-81ED-4DB2-BD59-A6C34878D82A}">
+                    <a16:rowId xmlns:a16="http://schemas.microsoft.com/office/drawing/2014/main" val="10003"/>
+                  </a:ext>
+                </a:extLst>
+              </a:tr>
+              <a:tr h="0">
+                <a:tc>
+                  <a:txBody>
+                    <a:bodyPr/>
+                    <a:lstStyle/>
+                    <a:p>
+                      <a:pPr marL="0" marR="0" lvl="0" indent="0" algn="l" rtl="0">
+                        <a:lnSpc>
+                          <a:spcPct val="100000"/>
+                        </a:lnSpc>
+                        <a:spcBef>
+                          <a:spcPts val="0"/>
+                        </a:spcBef>
+                        <a:spcAft>
+                          <a:spcPts val="0"/>
+                        </a:spcAft>
+                        <a:buClr>
+                          <a:srgbClr val="000000"/>
+                        </a:buClr>
+                        <a:buSzPts val="100"/>
+                        <a:buFont typeface="Arial"/>
+                        <a:buNone/>
+                      </a:pPr>
+                      <a:endParaRPr sz="100" u="none" strike="noStrike" cap="none"/>
+                    </a:p>
+                  </a:txBody>
+                  <a:tcPr marL="91450" marR="91450" marT="45725" marB="45725">
+                    <a:solidFill>
+                      <a:srgbClr val="D8D8D8"/>
+                    </a:solidFill>
+                  </a:tcPr>
+                </a:tc>
+                <a:tc>
+                  <a:txBody>
+                    <a:bodyPr/>
+                    <a:lstStyle/>
+                    <a:p>
+                      <a:pPr marL="0" marR="0" lvl="0" indent="0" algn="l" rtl="0">
+                        <a:lnSpc>
+                          <a:spcPct val="100000"/>
+                        </a:lnSpc>
+                        <a:spcBef>
+                          <a:spcPts val="0"/>
+                        </a:spcBef>
+                        <a:spcAft>
+                          <a:spcPts val="0"/>
+                        </a:spcAft>
+                        <a:buClr>
+                          <a:srgbClr val="000000"/>
+                        </a:buClr>
+                        <a:buSzPts val="100"/>
+                        <a:buFont typeface="Arial"/>
+                        <a:buNone/>
+                      </a:pPr>
+                      <a:endParaRPr sz="100" u="none" strike="noStrike" cap="none"/>
+                    </a:p>
+                  </a:txBody>
+                  <a:tcPr marL="91450" marR="91450" marT="45725" marB="45725">
+                    <a:solidFill>
+                      <a:srgbClr val="D8D8D8"/>
+                    </a:solidFill>
+                  </a:tcPr>
+                </a:tc>
+                <a:tc>
+                  <a:txBody>
+                    <a:bodyPr/>
+                    <a:lstStyle/>
+                    <a:p>
+                      <a:pPr marL="0" marR="0" lvl="0" indent="0" algn="l" rtl="0">
+                        <a:lnSpc>
+                          <a:spcPct val="100000"/>
+                        </a:lnSpc>
+                        <a:spcBef>
+                          <a:spcPts val="0"/>
+                        </a:spcBef>
+                        <a:spcAft>
+                          <a:spcPts val="0"/>
+                        </a:spcAft>
+                        <a:buClr>
+                          <a:srgbClr val="000000"/>
+                        </a:buClr>
+                        <a:buSzPts val="100"/>
+                        <a:buFont typeface="Arial"/>
+                        <a:buNone/>
+                      </a:pPr>
+                      <a:endParaRPr sz="100" u="none" strike="noStrike" cap="none"/>
+                    </a:p>
+                  </a:txBody>
+                  <a:tcPr marL="91450" marR="91450" marT="45725" marB="45725">
+                    <a:solidFill>
+                      <a:srgbClr val="D8D8D8"/>
+                    </a:solidFill>
+                  </a:tcPr>
+                </a:tc>
+                <a:tc>
+                  <a:txBody>
+                    <a:bodyPr/>
+                    <a:lstStyle/>
+                    <a:p>
+                      <a:pPr marL="0" marR="0" lvl="0" indent="0" algn="l" rtl="0">
+                        <a:lnSpc>
+                          <a:spcPct val="100000"/>
+                        </a:lnSpc>
+                        <a:spcBef>
+                          <a:spcPts val="0"/>
+                        </a:spcBef>
+                        <a:spcAft>
+                          <a:spcPts val="0"/>
+                        </a:spcAft>
+                        <a:buClr>
+                          <a:srgbClr val="000000"/>
+                        </a:buClr>
+                        <a:buSzPts val="100"/>
+                        <a:buFont typeface="Arial"/>
+                        <a:buNone/>
+                      </a:pPr>
+                      <a:endParaRPr sz="100" u="none" strike="noStrike" cap="none" dirty="0"/>
+                    </a:p>
+                  </a:txBody>
+                  <a:tcPr marL="91450" marR="91450" marT="45725" marB="45725">
+                    <a:solidFill>
+                      <a:srgbClr val="D8D8D8"/>
+                    </a:solidFill>
+                  </a:tcPr>
+                </a:tc>
+                <a:extLst>
+                  <a:ext uri="{0D108BD9-81ED-4DB2-BD59-A6C34878D82A}">
+                    <a16:rowId xmlns:a16="http://schemas.microsoft.com/office/drawing/2014/main" val="1680184215"/>
+                  </a:ext>
+                </a:extLst>
+              </a:tr>
+              <a:tr h="0">
+                <a:tc>
+                  <a:txBody>
+                    <a:bodyPr/>
+                    <a:lstStyle/>
+                    <a:p>
+                      <a:pPr marL="0" marR="0" lvl="0" indent="0" algn="l" rtl="0">
+                        <a:lnSpc>
+                          <a:spcPct val="100000"/>
+                        </a:lnSpc>
+                        <a:spcBef>
+                          <a:spcPts val="0"/>
+                        </a:spcBef>
+                        <a:spcAft>
+                          <a:spcPts val="0"/>
+                        </a:spcAft>
+                        <a:buClr>
+                          <a:srgbClr val="000000"/>
+                        </a:buClr>
+                        <a:buSzPts val="100"/>
+                        <a:buFont typeface="Arial"/>
+                        <a:buNone/>
+                      </a:pPr>
+                      <a:endParaRPr sz="100" u="none" strike="noStrike" cap="none" dirty="0"/>
+                    </a:p>
+                  </a:txBody>
+                  <a:tcPr marL="91450" marR="91450" marT="45725" marB="45725">
+                    <a:solidFill>
+                      <a:srgbClr val="D8D8D8"/>
+                    </a:solidFill>
+                  </a:tcPr>
+                </a:tc>
+                <a:tc>
+                  <a:txBody>
+                    <a:bodyPr/>
+                    <a:lstStyle/>
+                    <a:p>
+                      <a:pPr marL="0" marR="0" lvl="0" indent="0" algn="l" rtl="0">
+                        <a:lnSpc>
+                          <a:spcPct val="100000"/>
+                        </a:lnSpc>
+                        <a:spcBef>
+                          <a:spcPts val="0"/>
+                        </a:spcBef>
+                        <a:spcAft>
+                          <a:spcPts val="0"/>
+                        </a:spcAft>
+                        <a:buClr>
+                          <a:srgbClr val="000000"/>
+                        </a:buClr>
+                        <a:buSzPts val="100"/>
+                        <a:buFont typeface="Arial"/>
+                        <a:buNone/>
+                      </a:pPr>
+                      <a:endParaRPr sz="100" u="none" strike="noStrike" cap="none"/>
+                    </a:p>
+                  </a:txBody>
+                  <a:tcPr marL="91450" marR="91450" marT="45725" marB="45725">
+                    <a:solidFill>
+                      <a:srgbClr val="D8D8D8"/>
+                    </a:solidFill>
+                  </a:tcPr>
+                </a:tc>
+                <a:tc>
+                  <a:txBody>
+                    <a:bodyPr/>
+                    <a:lstStyle/>
+                    <a:p>
+                      <a:pPr marL="0" marR="0" lvl="0" indent="0" algn="l" rtl="0">
+                        <a:lnSpc>
+                          <a:spcPct val="100000"/>
+                        </a:lnSpc>
+                        <a:spcBef>
+                          <a:spcPts val="0"/>
+                        </a:spcBef>
+                        <a:spcAft>
+                          <a:spcPts val="0"/>
+                        </a:spcAft>
+                        <a:buClr>
+                          <a:srgbClr val="000000"/>
+                        </a:buClr>
+                        <a:buSzPts val="100"/>
+                        <a:buFont typeface="Arial"/>
+                        <a:buNone/>
+                      </a:pPr>
+                      <a:endParaRPr sz="100" u="none" strike="noStrike" cap="none"/>
+                    </a:p>
+                  </a:txBody>
+                  <a:tcPr marL="91450" marR="91450" marT="45725" marB="45725">
+                    <a:solidFill>
+                      <a:srgbClr val="D8D8D8"/>
+                    </a:solidFill>
+                  </a:tcPr>
+                </a:tc>
+                <a:tc>
+                  <a:txBody>
+                    <a:bodyPr/>
+                    <a:lstStyle/>
+                    <a:p>
+                      <a:pPr marL="0" marR="0" lvl="0" indent="0" algn="l" rtl="0">
+                        <a:lnSpc>
+                          <a:spcPct val="100000"/>
+                        </a:lnSpc>
+                        <a:spcBef>
+                          <a:spcPts val="0"/>
+                        </a:spcBef>
+                        <a:spcAft>
+                          <a:spcPts val="0"/>
+                        </a:spcAft>
+                        <a:buClr>
+                          <a:srgbClr val="000000"/>
+                        </a:buClr>
+                        <a:buSzPts val="100"/>
+                        <a:buFont typeface="Arial"/>
+                        <a:buNone/>
+                      </a:pPr>
+                      <a:endParaRPr sz="100" u="none" strike="noStrike" cap="none"/>
+                    </a:p>
+                  </a:txBody>
+                  <a:tcPr marL="91450" marR="91450" marT="45725" marB="45725">
+                    <a:solidFill>
+                      <a:srgbClr val="D8D8D8"/>
+                    </a:solidFill>
+                  </a:tcPr>
+                </a:tc>
+                <a:extLst>
+                  <a:ext uri="{0D108BD9-81ED-4DB2-BD59-A6C34878D82A}">
+                    <a16:rowId xmlns:a16="http://schemas.microsoft.com/office/drawing/2014/main" val="10004"/>
+                  </a:ext>
+                </a:extLst>
+              </a:tr>
+              <a:tr h="0">
+                <a:tc>
+                  <a:txBody>
+                    <a:bodyPr/>
+                    <a:lstStyle/>
+                    <a:p>
+                      <a:pPr marL="0" marR="0" lvl="0" indent="0" algn="l" rtl="0">
+                        <a:lnSpc>
+                          <a:spcPct val="100000"/>
+                        </a:lnSpc>
+                        <a:spcBef>
+                          <a:spcPts val="0"/>
+                        </a:spcBef>
+                        <a:spcAft>
+                          <a:spcPts val="0"/>
+                        </a:spcAft>
+                        <a:buClr>
+                          <a:srgbClr val="000000"/>
+                        </a:buClr>
+                        <a:buSzPts val="100"/>
+                        <a:buFont typeface="Arial"/>
+                        <a:buNone/>
+                      </a:pPr>
+                      <a:endParaRPr sz="100" u="none" strike="noStrike" cap="none" dirty="0"/>
+                    </a:p>
+                  </a:txBody>
+                  <a:tcPr marL="91450" marR="91450" marT="45725" marB="45725">
+                    <a:solidFill>
+                      <a:srgbClr val="D8D8D8"/>
+                    </a:solidFill>
+                  </a:tcPr>
+                </a:tc>
+                <a:tc>
+                  <a:txBody>
+                    <a:bodyPr/>
+                    <a:lstStyle/>
+                    <a:p>
+                      <a:pPr marL="0" marR="0" lvl="0" indent="0" algn="l" rtl="0">
+                        <a:lnSpc>
+                          <a:spcPct val="100000"/>
+                        </a:lnSpc>
+                        <a:spcBef>
+                          <a:spcPts val="0"/>
+                        </a:spcBef>
+                        <a:spcAft>
+                          <a:spcPts val="0"/>
+                        </a:spcAft>
+                        <a:buClr>
+                          <a:srgbClr val="000000"/>
+                        </a:buClr>
+                        <a:buSzPts val="100"/>
+                        <a:buFont typeface="Arial"/>
+                        <a:buNone/>
+                      </a:pPr>
+                      <a:endParaRPr sz="100" u="none" strike="noStrike" cap="none"/>
+                    </a:p>
+                  </a:txBody>
+                  <a:tcPr marL="91450" marR="91450" marT="45725" marB="45725">
+                    <a:solidFill>
+                      <a:srgbClr val="D8D8D8"/>
+                    </a:solidFill>
+                  </a:tcPr>
+                </a:tc>
+                <a:tc>
+                  <a:txBody>
+                    <a:bodyPr/>
+                    <a:lstStyle/>
+                    <a:p>
+                      <a:pPr marL="0" marR="0" lvl="0" indent="0" algn="l" rtl="0">
+                        <a:lnSpc>
+                          <a:spcPct val="100000"/>
+                        </a:lnSpc>
+                        <a:spcBef>
+                          <a:spcPts val="0"/>
+                        </a:spcBef>
+                        <a:spcAft>
+                          <a:spcPts val="0"/>
+                        </a:spcAft>
+                        <a:buClr>
+                          <a:srgbClr val="000000"/>
+                        </a:buClr>
+                        <a:buSzPts val="100"/>
+                        <a:buFont typeface="Arial"/>
+                        <a:buNone/>
+                      </a:pPr>
+                      <a:endParaRPr sz="100" u="none" strike="noStrike" cap="none" dirty="0"/>
+                    </a:p>
+                  </a:txBody>
+                  <a:tcPr marL="91450" marR="91450" marT="45725" marB="45725">
+                    <a:solidFill>
+                      <a:srgbClr val="D8D8D8"/>
+                    </a:solidFill>
+                  </a:tcPr>
+                </a:tc>
+                <a:tc>
+                  <a:txBody>
+                    <a:bodyPr/>
+                    <a:lstStyle/>
+                    <a:p>
+                      <a:pPr marL="0" marR="0" lvl="0" indent="0" algn="l" rtl="0">
+                        <a:lnSpc>
+                          <a:spcPct val="100000"/>
+                        </a:lnSpc>
+                        <a:spcBef>
+                          <a:spcPts val="0"/>
+                        </a:spcBef>
+                        <a:spcAft>
+                          <a:spcPts val="0"/>
+                        </a:spcAft>
+                        <a:buClr>
+                          <a:srgbClr val="000000"/>
+                        </a:buClr>
+                        <a:buSzPts val="100"/>
+                        <a:buFont typeface="Arial"/>
+                        <a:buNone/>
+                      </a:pPr>
+                      <a:endParaRPr sz="100" u="none" strike="noStrike" cap="none" dirty="0"/>
+                    </a:p>
+                  </a:txBody>
+                  <a:tcPr marL="91450" marR="91450" marT="45725" marB="45725">
+                    <a:solidFill>
+                      <a:srgbClr val="D8D8D8"/>
+                    </a:solidFill>
+                  </a:tcPr>
+                </a:tc>
+                <a:extLst>
+                  <a:ext uri="{0D108BD9-81ED-4DB2-BD59-A6C34878D82A}">
+                    <a16:rowId xmlns:a16="http://schemas.microsoft.com/office/drawing/2014/main" val="10005"/>
+                  </a:ext>
+                </a:extLst>
+              </a:tr>
+            </a:tbl>
+          </a:graphicData>
+        </a:graphic>
+      </p:graphicFrame>
+      <p:sp>
+        <p:nvSpPr>
+          <p:cNvPr id="4" name="TextBox 3">
             <a:extLst>
               <a:ext uri="{FF2B5EF4-FFF2-40B4-BE49-F238E27FC236}">
-                <a16:creationId xmlns:a16="http://schemas.microsoft.com/office/drawing/2014/main" id="{13DC64B4-B070-0538-E6A7-29D8C41D38D5}"/>
+                <a16:creationId xmlns:a16="http://schemas.microsoft.com/office/drawing/2014/main" id="{CC3A94C5-4CB9-69D8-B09E-A098AE560F94}"/>
               </a:ext>
             </a:extLst>
           </p:cNvPr>
-          <p:cNvGrpSpPr/>
+          <p:cNvSpPr txBox="1"/>
           <p:nvPr/>
-        </p:nvGrpSpPr>
-        <p:grpSpPr>
+        </p:nvSpPr>
+        <p:spPr>
           <a:xfrm>
-            <a:off x="4349978" y="780127"/>
-            <a:ext cx="1108034" cy="759173"/>
-            <a:chOff x="4349978" y="780127"/>
-            <a:chExt cx="1108034" cy="759173"/>
+            <a:off x="4933751" y="780127"/>
+            <a:ext cx="311304" cy="215444"/>
           </a:xfrm>
-        </p:grpSpPr>
-        <p:graphicFrame>
-          <p:nvGraphicFramePr>
-            <p:cNvPr id="172" name="Google Shape;172;p8"/>
-            <p:cNvGraphicFramePr/>
-            <p:nvPr>
-              <p:extLst>
-                <p:ext uri="{D42A27DB-BD31-4B8C-83A1-F6EECF244321}">
-                  <p14:modId xmlns:p14="http://schemas.microsoft.com/office/powerpoint/2010/main" val="3237490217"/>
-                </p:ext>
-              </p:extLst>
-            </p:nvPr>
-          </p:nvGraphicFramePr>
-          <p:xfrm>
-            <a:off x="4572000" y="838200"/>
-            <a:ext cx="833200" cy="701100"/>
-          </p:xfrm>
-          <a:graphic>
-            <a:graphicData uri="http://schemas.openxmlformats.org/drawingml/2006/table">
-              <a:tbl>
-                <a:tblPr firstRow="1" bandRow="1">
-                  <a:noFill/>
-                  <a:tableStyleId>{12AFE262-C695-4DD4-B80E-62B22C3FB715}</a:tableStyleId>
-                </a:tblPr>
-                <a:tblGrid>
-                  <a:gridCol w="208300">
-                    <a:extLst>
-                      <a:ext uri="{9D8B030D-6E8A-4147-A177-3AD203B41FA5}">
-                        <a16:colId xmlns:a16="http://schemas.microsoft.com/office/drawing/2014/main" val="20000"/>
-                      </a:ext>
-                    </a:extLst>
-                  </a:gridCol>
-                  <a:gridCol w="208300">
-                    <a:extLst>
-                      <a:ext uri="{9D8B030D-6E8A-4147-A177-3AD203B41FA5}">
-                        <a16:colId xmlns:a16="http://schemas.microsoft.com/office/drawing/2014/main" val="20001"/>
-                      </a:ext>
-                    </a:extLst>
-                  </a:gridCol>
-                  <a:gridCol w="208300">
-                    <a:extLst>
-                      <a:ext uri="{9D8B030D-6E8A-4147-A177-3AD203B41FA5}">
-                        <a16:colId xmlns:a16="http://schemas.microsoft.com/office/drawing/2014/main" val="20002"/>
-                      </a:ext>
-                    </a:extLst>
-                  </a:gridCol>
-                  <a:gridCol w="208300">
-                    <a:extLst>
-                      <a:ext uri="{9D8B030D-6E8A-4147-A177-3AD203B41FA5}">
-                        <a16:colId xmlns:a16="http://schemas.microsoft.com/office/drawing/2014/main" val="20003"/>
-                      </a:ext>
-                    </a:extLst>
-                  </a:gridCol>
-                </a:tblGrid>
-                <a:tr h="0">
-                  <a:tc>
-                    <a:txBody>
-                      <a:bodyPr/>
-                      <a:lstStyle/>
-                      <a:p>
-                        <a:pPr marL="0" marR="0" lvl="0" indent="0" algn="l" rtl="0">
-                          <a:lnSpc>
-                            <a:spcPct val="100000"/>
-                          </a:lnSpc>
-                          <a:spcBef>
-                            <a:spcPts val="0"/>
-                          </a:spcBef>
-                          <a:spcAft>
-                            <a:spcPts val="0"/>
-                          </a:spcAft>
-                          <a:buClr>
-                            <a:srgbClr val="000000"/>
-                          </a:buClr>
-                          <a:buSzPts val="100"/>
-                          <a:buFont typeface="Arial"/>
-                          <a:buNone/>
-                        </a:pPr>
-                        <a:endParaRPr sz="100" u="none" strike="noStrike" cap="none">
-                          <a:solidFill>
-                            <a:srgbClr val="002060"/>
-                          </a:solidFill>
-                          <a:highlight>
-                            <a:srgbClr val="0000FF"/>
-                          </a:highlight>
-                        </a:endParaRPr>
-                      </a:p>
-                    </a:txBody>
-                    <a:tcPr marL="91450" marR="91450" marT="45725" marB="45725">
-                      <a:solidFill>
-                        <a:srgbClr val="D8D8D8"/>
-                      </a:solidFill>
-                    </a:tcPr>
-                  </a:tc>
-                  <a:tc>
-                    <a:txBody>
-                      <a:bodyPr/>
-                      <a:lstStyle/>
-                      <a:p>
-                        <a:pPr marL="0" marR="0" lvl="0" indent="0" algn="l" rtl="0">
-                          <a:lnSpc>
-                            <a:spcPct val="100000"/>
-                          </a:lnSpc>
-                          <a:spcBef>
-                            <a:spcPts val="0"/>
-                          </a:spcBef>
-                          <a:spcAft>
-                            <a:spcPts val="0"/>
-                          </a:spcAft>
-                          <a:buClr>
-                            <a:srgbClr val="000000"/>
-                          </a:buClr>
-                          <a:buSzPts val="100"/>
-                          <a:buFont typeface="Arial"/>
-                          <a:buNone/>
-                        </a:pPr>
-                        <a:endParaRPr sz="100" u="none" strike="noStrike" cap="none">
-                          <a:solidFill>
-                            <a:srgbClr val="002060"/>
-                          </a:solidFill>
-                          <a:highlight>
-                            <a:srgbClr val="0000FF"/>
-                          </a:highlight>
-                        </a:endParaRPr>
-                      </a:p>
-                    </a:txBody>
-                    <a:tcPr marL="91450" marR="91450" marT="45725" marB="45725">
-                      <a:solidFill>
-                        <a:srgbClr val="D8D8D8"/>
-                      </a:solidFill>
-                    </a:tcPr>
-                  </a:tc>
-                  <a:tc>
-                    <a:txBody>
-                      <a:bodyPr/>
-                      <a:lstStyle/>
-                      <a:p>
-                        <a:pPr marL="0" marR="0" lvl="0" indent="0" algn="l" rtl="0">
-                          <a:lnSpc>
-                            <a:spcPct val="100000"/>
-                          </a:lnSpc>
-                          <a:spcBef>
-                            <a:spcPts val="0"/>
-                          </a:spcBef>
-                          <a:spcAft>
-                            <a:spcPts val="0"/>
-                          </a:spcAft>
-                          <a:buClr>
-                            <a:srgbClr val="000000"/>
-                          </a:buClr>
-                          <a:buSzPts val="100"/>
-                          <a:buFont typeface="Arial"/>
-                          <a:buNone/>
-                        </a:pPr>
-                        <a:endParaRPr sz="100" u="none" strike="noStrike" cap="none">
-                          <a:solidFill>
-                            <a:srgbClr val="002060"/>
-                          </a:solidFill>
-                          <a:highlight>
-                            <a:srgbClr val="0000FF"/>
-                          </a:highlight>
-                        </a:endParaRPr>
-                      </a:p>
-                    </a:txBody>
-                    <a:tcPr marL="91450" marR="91450" marT="45725" marB="45725">
-                      <a:solidFill>
-                        <a:srgbClr val="D8D8D8"/>
-                      </a:solidFill>
-                    </a:tcPr>
-                  </a:tc>
-                  <a:tc>
-                    <a:txBody>
-                      <a:bodyPr/>
-                      <a:lstStyle/>
-                      <a:p>
-                        <a:pPr marL="0" marR="0" lvl="0" indent="0" algn="l" rtl="0">
-                          <a:lnSpc>
-                            <a:spcPct val="100000"/>
-                          </a:lnSpc>
-                          <a:spcBef>
-                            <a:spcPts val="0"/>
-                          </a:spcBef>
-                          <a:spcAft>
-                            <a:spcPts val="0"/>
-                          </a:spcAft>
-                          <a:buClr>
-                            <a:srgbClr val="000000"/>
-                          </a:buClr>
-                          <a:buSzPts val="100"/>
-                          <a:buFont typeface="Arial"/>
-                          <a:buNone/>
-                        </a:pPr>
-                        <a:endParaRPr sz="100" u="none" strike="noStrike" cap="none">
-                          <a:solidFill>
-                            <a:srgbClr val="002060"/>
-                          </a:solidFill>
-                          <a:highlight>
-                            <a:srgbClr val="0000FF"/>
-                          </a:highlight>
-                        </a:endParaRPr>
-                      </a:p>
-                    </a:txBody>
-                    <a:tcPr marL="91450" marR="91450" marT="45725" marB="45725">
-                      <a:solidFill>
-                        <a:srgbClr val="D8D8D8"/>
-                      </a:solidFill>
-                    </a:tcPr>
-                  </a:tc>
-                  <a:extLst>
-                    <a:ext uri="{0D108BD9-81ED-4DB2-BD59-A6C34878D82A}">
-                      <a16:rowId xmlns:a16="http://schemas.microsoft.com/office/drawing/2014/main" val="10000"/>
-                    </a:ext>
-                  </a:extLst>
-                </a:tr>
-                <a:tr h="0">
-                  <a:tc>
-                    <a:txBody>
-                      <a:bodyPr/>
-                      <a:lstStyle/>
-                      <a:p>
-                        <a:pPr marL="0" marR="0" lvl="0" indent="0" algn="l" rtl="0">
-                          <a:lnSpc>
-                            <a:spcPct val="100000"/>
-                          </a:lnSpc>
-                          <a:spcBef>
-                            <a:spcPts val="0"/>
-                          </a:spcBef>
-                          <a:spcAft>
-                            <a:spcPts val="0"/>
-                          </a:spcAft>
-                          <a:buClr>
-                            <a:srgbClr val="000000"/>
-                          </a:buClr>
-                          <a:buSzPts val="100"/>
-                          <a:buFont typeface="Arial"/>
-                          <a:buNone/>
-                        </a:pPr>
-                        <a:endParaRPr sz="100" u="none" strike="noStrike" cap="none">
-                          <a:solidFill>
-                            <a:srgbClr val="002060"/>
-                          </a:solidFill>
-                          <a:highlight>
-                            <a:srgbClr val="0000FF"/>
-                          </a:highlight>
-                        </a:endParaRPr>
-                      </a:p>
-                    </a:txBody>
-                    <a:tcPr marL="91450" marR="91450" marT="45725" marB="45725">
-                      <a:solidFill>
-                        <a:srgbClr val="D8D8D8"/>
-                      </a:solidFill>
-                    </a:tcPr>
-                  </a:tc>
-                  <a:tc>
-                    <a:txBody>
-                      <a:bodyPr/>
-                      <a:lstStyle/>
-                      <a:p>
-                        <a:pPr marL="0" marR="0" lvl="0" indent="0" algn="l" rtl="0">
-                          <a:lnSpc>
-                            <a:spcPct val="100000"/>
-                          </a:lnSpc>
-                          <a:spcBef>
-                            <a:spcPts val="0"/>
-                          </a:spcBef>
-                          <a:spcAft>
-                            <a:spcPts val="0"/>
-                          </a:spcAft>
-                          <a:buClr>
-                            <a:srgbClr val="000000"/>
-                          </a:buClr>
-                          <a:buSzPts val="100"/>
-                          <a:buFont typeface="Arial"/>
-                          <a:buNone/>
-                        </a:pPr>
-                        <a:endParaRPr sz="100" u="none" strike="noStrike" cap="none">
-                          <a:solidFill>
-                            <a:srgbClr val="002060"/>
-                          </a:solidFill>
-                          <a:highlight>
-                            <a:srgbClr val="0000FF"/>
-                          </a:highlight>
-                        </a:endParaRPr>
-                      </a:p>
-                    </a:txBody>
-                    <a:tcPr marL="91450" marR="91450" marT="45725" marB="45725">
-                      <a:solidFill>
-                        <a:srgbClr val="D8D8D8"/>
-                      </a:solidFill>
-                    </a:tcPr>
-                  </a:tc>
-                  <a:tc>
-                    <a:txBody>
-                      <a:bodyPr/>
-                      <a:lstStyle/>
-                      <a:p>
-                        <a:pPr marL="0" marR="0" lvl="0" indent="0" algn="l" rtl="0">
-                          <a:lnSpc>
-                            <a:spcPct val="100000"/>
-                          </a:lnSpc>
-                          <a:spcBef>
-                            <a:spcPts val="0"/>
-                          </a:spcBef>
-                          <a:spcAft>
-                            <a:spcPts val="0"/>
-                          </a:spcAft>
-                          <a:buClr>
-                            <a:srgbClr val="000000"/>
-                          </a:buClr>
-                          <a:buSzPts val="100"/>
-                          <a:buFont typeface="Arial"/>
-                          <a:buNone/>
-                        </a:pPr>
-                        <a:endParaRPr sz="100" u="none" strike="noStrike" cap="none">
-                          <a:solidFill>
-                            <a:srgbClr val="002060"/>
-                          </a:solidFill>
-                          <a:highlight>
-                            <a:srgbClr val="0000FF"/>
-                          </a:highlight>
-                        </a:endParaRPr>
-                      </a:p>
-                    </a:txBody>
-                    <a:tcPr marL="91450" marR="91450" marT="45725" marB="45725">
-                      <a:solidFill>
-                        <a:srgbClr val="D8D8D8"/>
-                      </a:solidFill>
-                    </a:tcPr>
-                  </a:tc>
-                  <a:tc>
-                    <a:txBody>
-                      <a:bodyPr/>
-                      <a:lstStyle/>
-                      <a:p>
-                        <a:pPr marL="0" marR="0" lvl="0" indent="0" algn="l" rtl="0">
-                          <a:lnSpc>
-                            <a:spcPct val="100000"/>
-                          </a:lnSpc>
-                          <a:spcBef>
-                            <a:spcPts val="0"/>
-                          </a:spcBef>
-                          <a:spcAft>
-                            <a:spcPts val="0"/>
-                          </a:spcAft>
-                          <a:buClr>
-                            <a:srgbClr val="000000"/>
-                          </a:buClr>
-                          <a:buSzPts val="100"/>
-                          <a:buFont typeface="Arial"/>
-                          <a:buNone/>
-                        </a:pPr>
-                        <a:endParaRPr sz="100" u="none" strike="noStrike" cap="none">
-                          <a:solidFill>
-                            <a:srgbClr val="002060"/>
-                          </a:solidFill>
-                          <a:highlight>
-                            <a:srgbClr val="0000FF"/>
-                          </a:highlight>
-                        </a:endParaRPr>
-                      </a:p>
-                    </a:txBody>
-                    <a:tcPr marL="91450" marR="91450" marT="45725" marB="45725">
-                      <a:solidFill>
-                        <a:srgbClr val="D8D8D8"/>
-                      </a:solidFill>
-                    </a:tcPr>
-                  </a:tc>
-                  <a:extLst>
-                    <a:ext uri="{0D108BD9-81ED-4DB2-BD59-A6C34878D82A}">
-                      <a16:rowId xmlns:a16="http://schemas.microsoft.com/office/drawing/2014/main" val="10001"/>
-                    </a:ext>
-                  </a:extLst>
-                </a:tr>
-                <a:tr h="0">
-                  <a:tc>
-                    <a:txBody>
-                      <a:bodyPr/>
-                      <a:lstStyle/>
-                      <a:p>
-                        <a:pPr marL="0" marR="0" lvl="0" indent="0" algn="l" rtl="0">
-                          <a:lnSpc>
-                            <a:spcPct val="100000"/>
-                          </a:lnSpc>
-                          <a:spcBef>
-                            <a:spcPts val="0"/>
-                          </a:spcBef>
-                          <a:spcAft>
-                            <a:spcPts val="0"/>
-                          </a:spcAft>
-                          <a:buClr>
-                            <a:srgbClr val="000000"/>
-                          </a:buClr>
-                          <a:buSzPts val="100"/>
-                          <a:buFont typeface="Arial"/>
-                          <a:buNone/>
-                        </a:pPr>
-                        <a:endParaRPr sz="100" u="none" strike="noStrike" cap="none"/>
-                      </a:p>
-                    </a:txBody>
-                    <a:tcPr marL="91450" marR="91450" marT="45725" marB="45725">
-                      <a:solidFill>
-                        <a:srgbClr val="D8D8D8"/>
-                      </a:solidFill>
-                    </a:tcPr>
-                  </a:tc>
-                  <a:tc>
-                    <a:txBody>
-                      <a:bodyPr/>
-                      <a:lstStyle/>
-                      <a:p>
-                        <a:pPr marL="0" marR="0" lvl="0" indent="0" algn="l" rtl="0">
-                          <a:lnSpc>
-                            <a:spcPct val="100000"/>
-                          </a:lnSpc>
-                          <a:spcBef>
-                            <a:spcPts val="0"/>
-                          </a:spcBef>
-                          <a:spcAft>
-                            <a:spcPts val="0"/>
-                          </a:spcAft>
-                          <a:buClr>
-                            <a:srgbClr val="000000"/>
-                          </a:buClr>
-                          <a:buSzPts val="100"/>
-                          <a:buFont typeface="Arial"/>
-                          <a:buNone/>
-                        </a:pPr>
-                        <a:endParaRPr sz="100" u="none" strike="noStrike" cap="none"/>
-                      </a:p>
-                    </a:txBody>
-                    <a:tcPr marL="91450" marR="91450" marT="45725" marB="45725">
-                      <a:solidFill>
-                        <a:srgbClr val="D8D8D8"/>
-                      </a:solidFill>
-                    </a:tcPr>
-                  </a:tc>
-                  <a:tc>
-                    <a:txBody>
-                      <a:bodyPr/>
-                      <a:lstStyle/>
-                      <a:p>
-                        <a:pPr marL="0" marR="0" lvl="0" indent="0" algn="l" rtl="0">
-                          <a:lnSpc>
-                            <a:spcPct val="100000"/>
-                          </a:lnSpc>
-                          <a:spcBef>
-                            <a:spcPts val="0"/>
-                          </a:spcBef>
-                          <a:spcAft>
-                            <a:spcPts val="0"/>
-                          </a:spcAft>
-                          <a:buClr>
-                            <a:srgbClr val="000000"/>
-                          </a:buClr>
-                          <a:buSzPts val="100"/>
-                          <a:buFont typeface="Arial"/>
-                          <a:buNone/>
-                        </a:pPr>
-                        <a:endParaRPr sz="100" u="none" strike="noStrike" cap="none"/>
-                      </a:p>
-                    </a:txBody>
-                    <a:tcPr marL="91450" marR="91450" marT="45725" marB="45725">
-                      <a:solidFill>
-                        <a:srgbClr val="D8D8D8"/>
-                      </a:solidFill>
-                    </a:tcPr>
-                  </a:tc>
-                  <a:tc>
-                    <a:txBody>
-                      <a:bodyPr/>
-                      <a:lstStyle/>
-                      <a:p>
-                        <a:pPr marL="0" marR="0" lvl="0" indent="0" algn="l" rtl="0">
-                          <a:lnSpc>
-                            <a:spcPct val="100000"/>
-                          </a:lnSpc>
-                          <a:spcBef>
-                            <a:spcPts val="0"/>
-                          </a:spcBef>
-                          <a:spcAft>
-                            <a:spcPts val="0"/>
-                          </a:spcAft>
-                          <a:buClr>
-                            <a:srgbClr val="000000"/>
-                          </a:buClr>
-                          <a:buSzPts val="100"/>
-                          <a:buFont typeface="Arial"/>
-                          <a:buNone/>
-                        </a:pPr>
-                        <a:endParaRPr sz="100" u="none" strike="noStrike" cap="none"/>
-                      </a:p>
-                    </a:txBody>
-                    <a:tcPr marL="91450" marR="91450" marT="45725" marB="45725">
-                      <a:solidFill>
-                        <a:srgbClr val="D8D8D8"/>
-                      </a:solidFill>
-                    </a:tcPr>
-                  </a:tc>
-                  <a:extLst>
-                    <a:ext uri="{0D108BD9-81ED-4DB2-BD59-A6C34878D82A}">
-                      <a16:rowId xmlns:a16="http://schemas.microsoft.com/office/drawing/2014/main" val="10002"/>
-                    </a:ext>
-                  </a:extLst>
-                </a:tr>
-                <a:tr h="0">
-                  <a:tc>
-                    <a:txBody>
-                      <a:bodyPr/>
-                      <a:lstStyle/>
-                      <a:p>
-                        <a:pPr marL="0" marR="0" lvl="0" indent="0" algn="l" rtl="0">
-                          <a:lnSpc>
-                            <a:spcPct val="100000"/>
-                          </a:lnSpc>
-                          <a:spcBef>
-                            <a:spcPts val="0"/>
-                          </a:spcBef>
-                          <a:spcAft>
-                            <a:spcPts val="0"/>
-                          </a:spcAft>
-                          <a:buClr>
-                            <a:srgbClr val="000000"/>
-                          </a:buClr>
-                          <a:buSzPts val="100"/>
-                          <a:buFont typeface="Arial"/>
-                          <a:buNone/>
-                        </a:pPr>
-                        <a:endParaRPr sz="100" u="none" strike="noStrike" cap="none"/>
-                      </a:p>
-                    </a:txBody>
-                    <a:tcPr marL="91450" marR="91450" marT="45725" marB="45725">
-                      <a:solidFill>
-                        <a:srgbClr val="D8D8D8"/>
-                      </a:solidFill>
-                    </a:tcPr>
-                  </a:tc>
-                  <a:tc>
-                    <a:txBody>
-                      <a:bodyPr/>
-                      <a:lstStyle/>
-                      <a:p>
-                        <a:pPr marL="0" marR="0" lvl="0" indent="0" algn="l" rtl="0">
-                          <a:lnSpc>
-                            <a:spcPct val="100000"/>
-                          </a:lnSpc>
-                          <a:spcBef>
-                            <a:spcPts val="0"/>
-                          </a:spcBef>
-                          <a:spcAft>
-                            <a:spcPts val="0"/>
-                          </a:spcAft>
-                          <a:buClr>
-                            <a:srgbClr val="000000"/>
-                          </a:buClr>
-                          <a:buSzPts val="100"/>
-                          <a:buFont typeface="Arial"/>
-                          <a:buNone/>
-                        </a:pPr>
-                        <a:endParaRPr sz="100" u="none" strike="noStrike" cap="none"/>
-                      </a:p>
-                    </a:txBody>
-                    <a:tcPr marL="91450" marR="91450" marT="45725" marB="45725">
-                      <a:solidFill>
-                        <a:srgbClr val="D8D8D8"/>
-                      </a:solidFill>
-                    </a:tcPr>
-                  </a:tc>
-                  <a:tc>
-                    <a:txBody>
-                      <a:bodyPr/>
-                      <a:lstStyle/>
-                      <a:p>
-                        <a:pPr marL="0" marR="0" lvl="0" indent="0" algn="l" rtl="0">
-                          <a:lnSpc>
-                            <a:spcPct val="100000"/>
-                          </a:lnSpc>
-                          <a:spcBef>
-                            <a:spcPts val="0"/>
-                          </a:spcBef>
-                          <a:spcAft>
-                            <a:spcPts val="0"/>
-                          </a:spcAft>
-                          <a:buClr>
-                            <a:srgbClr val="000000"/>
-                          </a:buClr>
-                          <a:buSzPts val="100"/>
-                          <a:buFont typeface="Arial"/>
-                          <a:buNone/>
-                        </a:pPr>
-                        <a:endParaRPr sz="100" u="none" strike="noStrike" cap="none"/>
-                      </a:p>
-                    </a:txBody>
-                    <a:tcPr marL="91450" marR="91450" marT="45725" marB="45725">
-                      <a:solidFill>
-                        <a:srgbClr val="D8D8D8"/>
-                      </a:solidFill>
-                    </a:tcPr>
-                  </a:tc>
-                  <a:tc>
-                    <a:txBody>
-                      <a:bodyPr/>
-                      <a:lstStyle/>
-                      <a:p>
-                        <a:pPr marL="0" marR="0" lvl="0" indent="0" algn="l" rtl="0">
-                          <a:lnSpc>
-                            <a:spcPct val="100000"/>
-                          </a:lnSpc>
-                          <a:spcBef>
-                            <a:spcPts val="0"/>
-                          </a:spcBef>
-                          <a:spcAft>
-                            <a:spcPts val="0"/>
-                          </a:spcAft>
-                          <a:buClr>
-                            <a:srgbClr val="000000"/>
-                          </a:buClr>
-                          <a:buSzPts val="100"/>
-                          <a:buFont typeface="Arial"/>
-                          <a:buNone/>
-                        </a:pPr>
-                        <a:endParaRPr sz="100" u="none" strike="noStrike" cap="none"/>
-                      </a:p>
-                    </a:txBody>
-                    <a:tcPr marL="91450" marR="91450" marT="45725" marB="45725">
-                      <a:solidFill>
-                        <a:srgbClr val="D8D8D8"/>
-                      </a:solidFill>
-                    </a:tcPr>
-                  </a:tc>
-                  <a:extLst>
-                    <a:ext uri="{0D108BD9-81ED-4DB2-BD59-A6C34878D82A}">
-                      <a16:rowId xmlns:a16="http://schemas.microsoft.com/office/drawing/2014/main" val="10003"/>
-                    </a:ext>
-                  </a:extLst>
-                </a:tr>
-                <a:tr h="0">
-                  <a:tc>
-                    <a:txBody>
-                      <a:bodyPr/>
-                      <a:lstStyle/>
-                      <a:p>
-                        <a:pPr marL="0" marR="0" lvl="0" indent="0" algn="l" rtl="0">
-                          <a:lnSpc>
-                            <a:spcPct val="100000"/>
-                          </a:lnSpc>
-                          <a:spcBef>
-                            <a:spcPts val="0"/>
-                          </a:spcBef>
-                          <a:spcAft>
-                            <a:spcPts val="0"/>
-                          </a:spcAft>
-                          <a:buClr>
-                            <a:srgbClr val="000000"/>
-                          </a:buClr>
-                          <a:buSzPts val="100"/>
-                          <a:buFont typeface="Arial"/>
-                          <a:buNone/>
-                        </a:pPr>
-                        <a:endParaRPr sz="100" u="none" strike="noStrike" cap="none" dirty="0"/>
-                      </a:p>
-                    </a:txBody>
-                    <a:tcPr marL="91450" marR="91450" marT="45725" marB="45725">
-                      <a:solidFill>
-                        <a:srgbClr val="D8D8D8"/>
-                      </a:solidFill>
-                    </a:tcPr>
-                  </a:tc>
-                  <a:tc>
-                    <a:txBody>
-                      <a:bodyPr/>
-                      <a:lstStyle/>
-                      <a:p>
-                        <a:pPr marL="0" marR="0" lvl="0" indent="0" algn="l" rtl="0">
-                          <a:lnSpc>
-                            <a:spcPct val="100000"/>
-                          </a:lnSpc>
-                          <a:spcBef>
-                            <a:spcPts val="0"/>
-                          </a:spcBef>
-                          <a:spcAft>
-                            <a:spcPts val="0"/>
-                          </a:spcAft>
-                          <a:buClr>
-                            <a:srgbClr val="000000"/>
-                          </a:buClr>
-                          <a:buSzPts val="100"/>
-                          <a:buFont typeface="Arial"/>
-                          <a:buNone/>
-                        </a:pPr>
-                        <a:endParaRPr sz="100" u="none" strike="noStrike" cap="none"/>
-                      </a:p>
-                    </a:txBody>
-                    <a:tcPr marL="91450" marR="91450" marT="45725" marB="45725">
-                      <a:solidFill>
-                        <a:srgbClr val="D8D8D8"/>
-                      </a:solidFill>
-                    </a:tcPr>
-                  </a:tc>
-                  <a:tc>
-                    <a:txBody>
-                      <a:bodyPr/>
-                      <a:lstStyle/>
-                      <a:p>
-                        <a:pPr marL="0" marR="0" lvl="0" indent="0" algn="l" rtl="0">
-                          <a:lnSpc>
-                            <a:spcPct val="100000"/>
-                          </a:lnSpc>
-                          <a:spcBef>
-                            <a:spcPts val="0"/>
-                          </a:spcBef>
-                          <a:spcAft>
-                            <a:spcPts val="0"/>
-                          </a:spcAft>
-                          <a:buClr>
-                            <a:srgbClr val="000000"/>
-                          </a:buClr>
-                          <a:buSzPts val="100"/>
-                          <a:buFont typeface="Arial"/>
-                          <a:buNone/>
-                        </a:pPr>
-                        <a:endParaRPr sz="100" u="none" strike="noStrike" cap="none"/>
-                      </a:p>
-                    </a:txBody>
-                    <a:tcPr marL="91450" marR="91450" marT="45725" marB="45725">
-                      <a:solidFill>
-                        <a:srgbClr val="D8D8D8"/>
-                      </a:solidFill>
-                    </a:tcPr>
-                  </a:tc>
-                  <a:tc>
-                    <a:txBody>
-                      <a:bodyPr/>
-                      <a:lstStyle/>
-                      <a:p>
-                        <a:pPr marL="0" marR="0" lvl="0" indent="0" algn="l" rtl="0">
-                          <a:lnSpc>
-                            <a:spcPct val="100000"/>
-                          </a:lnSpc>
-                          <a:spcBef>
-                            <a:spcPts val="0"/>
-                          </a:spcBef>
-                          <a:spcAft>
-                            <a:spcPts val="0"/>
-                          </a:spcAft>
-                          <a:buClr>
-                            <a:srgbClr val="000000"/>
-                          </a:buClr>
-                          <a:buSzPts val="100"/>
-                          <a:buFont typeface="Arial"/>
-                          <a:buNone/>
-                        </a:pPr>
-                        <a:endParaRPr sz="100" u="none" strike="noStrike" cap="none"/>
-                      </a:p>
-                    </a:txBody>
-                    <a:tcPr marL="91450" marR="91450" marT="45725" marB="45725">
-                      <a:solidFill>
-                        <a:srgbClr val="D8D8D8"/>
-                      </a:solidFill>
-                    </a:tcPr>
-                  </a:tc>
-                  <a:extLst>
-                    <a:ext uri="{0D108BD9-81ED-4DB2-BD59-A6C34878D82A}">
-                      <a16:rowId xmlns:a16="http://schemas.microsoft.com/office/drawing/2014/main" val="10004"/>
-                    </a:ext>
-                  </a:extLst>
-                </a:tr>
-                <a:tr h="0">
-                  <a:tc>
-                    <a:txBody>
-                      <a:bodyPr/>
-                      <a:lstStyle/>
-                      <a:p>
-                        <a:pPr marL="0" marR="0" lvl="0" indent="0" algn="l" rtl="0">
-                          <a:lnSpc>
-                            <a:spcPct val="100000"/>
-                          </a:lnSpc>
-                          <a:spcBef>
-                            <a:spcPts val="0"/>
-                          </a:spcBef>
-                          <a:spcAft>
-                            <a:spcPts val="0"/>
-                          </a:spcAft>
-                          <a:buClr>
-                            <a:srgbClr val="000000"/>
-                          </a:buClr>
-                          <a:buSzPts val="100"/>
-                          <a:buFont typeface="Arial"/>
-                          <a:buNone/>
-                        </a:pPr>
-                        <a:endParaRPr sz="100" u="none" strike="noStrike" cap="none" dirty="0"/>
-                      </a:p>
-                    </a:txBody>
-                    <a:tcPr marL="91450" marR="91450" marT="45725" marB="45725">
-                      <a:solidFill>
-                        <a:srgbClr val="D8D8D8"/>
-                      </a:solidFill>
-                    </a:tcPr>
-                  </a:tc>
-                  <a:tc>
-                    <a:txBody>
-                      <a:bodyPr/>
-                      <a:lstStyle/>
-                      <a:p>
-                        <a:pPr marL="0" marR="0" lvl="0" indent="0" algn="l" rtl="0">
-                          <a:lnSpc>
-                            <a:spcPct val="100000"/>
-                          </a:lnSpc>
-                          <a:spcBef>
-                            <a:spcPts val="0"/>
-                          </a:spcBef>
-                          <a:spcAft>
-                            <a:spcPts val="0"/>
-                          </a:spcAft>
-                          <a:buClr>
-                            <a:srgbClr val="000000"/>
-                          </a:buClr>
-                          <a:buSzPts val="100"/>
-                          <a:buFont typeface="Arial"/>
-                          <a:buNone/>
-                        </a:pPr>
-                        <a:endParaRPr sz="100" u="none" strike="noStrike" cap="none"/>
-                      </a:p>
-                    </a:txBody>
-                    <a:tcPr marL="91450" marR="91450" marT="45725" marB="45725">
-                      <a:solidFill>
-                        <a:srgbClr val="D8D8D8"/>
-                      </a:solidFill>
-                    </a:tcPr>
-                  </a:tc>
-                  <a:tc>
-                    <a:txBody>
-                      <a:bodyPr/>
-                      <a:lstStyle/>
-                      <a:p>
-                        <a:pPr marL="0" marR="0" lvl="0" indent="0" algn="l" rtl="0">
-                          <a:lnSpc>
-                            <a:spcPct val="100000"/>
-                          </a:lnSpc>
-                          <a:spcBef>
-                            <a:spcPts val="0"/>
-                          </a:spcBef>
-                          <a:spcAft>
-                            <a:spcPts val="0"/>
-                          </a:spcAft>
-                          <a:buClr>
-                            <a:srgbClr val="000000"/>
-                          </a:buClr>
-                          <a:buSzPts val="100"/>
-                          <a:buFont typeface="Arial"/>
-                          <a:buNone/>
-                        </a:pPr>
-                        <a:endParaRPr sz="100" u="none" strike="noStrike" cap="none"/>
-                      </a:p>
-                    </a:txBody>
-                    <a:tcPr marL="91450" marR="91450" marT="45725" marB="45725">
-                      <a:solidFill>
-                        <a:srgbClr val="D8D8D8"/>
-                      </a:solidFill>
-                    </a:tcPr>
-                  </a:tc>
-                  <a:tc>
-                    <a:txBody>
-                      <a:bodyPr/>
-                      <a:lstStyle/>
-                      <a:p>
-                        <a:pPr marL="0" marR="0" lvl="0" indent="0" algn="l" rtl="0">
-                          <a:lnSpc>
-                            <a:spcPct val="100000"/>
-                          </a:lnSpc>
-                          <a:spcBef>
-                            <a:spcPts val="0"/>
-                          </a:spcBef>
-                          <a:spcAft>
-                            <a:spcPts val="0"/>
-                          </a:spcAft>
-                          <a:buClr>
-                            <a:srgbClr val="000000"/>
-                          </a:buClr>
-                          <a:buSzPts val="100"/>
-                          <a:buFont typeface="Arial"/>
-                          <a:buNone/>
-                        </a:pPr>
-                        <a:endParaRPr sz="100" u="none" strike="noStrike" cap="none" dirty="0"/>
-                      </a:p>
-                    </a:txBody>
-                    <a:tcPr marL="91450" marR="91450" marT="45725" marB="45725">
-                      <a:solidFill>
-                        <a:srgbClr val="D8D8D8"/>
-                      </a:solidFill>
-                    </a:tcPr>
-                  </a:tc>
-                  <a:extLst>
-                    <a:ext uri="{0D108BD9-81ED-4DB2-BD59-A6C34878D82A}">
-                      <a16:rowId xmlns:a16="http://schemas.microsoft.com/office/drawing/2014/main" val="10005"/>
-                    </a:ext>
-                  </a:extLst>
-                </a:tr>
-              </a:tbl>
-            </a:graphicData>
-          </a:graphic>
-        </p:graphicFrame>
-        <p:sp>
-          <p:nvSpPr>
-            <p:cNvPr id="4" name="TextBox 3">
-              <a:extLst>
-                <a:ext uri="{FF2B5EF4-FFF2-40B4-BE49-F238E27FC236}">
-                  <a16:creationId xmlns:a16="http://schemas.microsoft.com/office/drawing/2014/main" id="{CC3A94C5-4CB9-69D8-B09E-A098AE560F94}"/>
-                </a:ext>
-              </a:extLst>
-            </p:cNvPr>
-            <p:cNvSpPr txBox="1"/>
-            <p:nvPr/>
-          </p:nvSpPr>
-          <p:spPr>
-            <a:xfrm>
-              <a:off x="4933751" y="780127"/>
-              <a:ext cx="311304" cy="215444"/>
-            </a:xfrm>
-            <a:prstGeom prst="rect">
-              <a:avLst/>
-            </a:prstGeom>
-            <a:noFill/>
-          </p:spPr>
-          <p:txBody>
-            <a:bodyPr wrap="none" rtlCol="0">
-              <a:spAutoFit/>
-            </a:bodyPr>
-            <a:lstStyle/>
-            <a:p>
-              <a:r>
-                <a:rPr lang="en-US" sz="800" dirty="0"/>
-                <a:t>S3</a:t>
-              </a:r>
-            </a:p>
-          </p:txBody>
-        </p:sp>
-        <p:sp>
-          <p:nvSpPr>
-            <p:cNvPr id="6" name="TextBox 5">
-              <a:extLst>
-                <a:ext uri="{FF2B5EF4-FFF2-40B4-BE49-F238E27FC236}">
-                  <a16:creationId xmlns:a16="http://schemas.microsoft.com/office/drawing/2014/main" id="{531F2EFA-B603-2FC8-B718-52F34741EC65}"/>
-                </a:ext>
-              </a:extLst>
-            </p:cNvPr>
-            <p:cNvSpPr txBox="1"/>
-            <p:nvPr/>
-          </p:nvSpPr>
-          <p:spPr>
-            <a:xfrm>
-              <a:off x="5146708" y="787189"/>
-              <a:ext cx="311304" cy="215444"/>
-            </a:xfrm>
-            <a:prstGeom prst="rect">
-              <a:avLst/>
-            </a:prstGeom>
-            <a:noFill/>
-          </p:spPr>
-          <p:txBody>
-            <a:bodyPr wrap="none" rtlCol="0">
-              <a:spAutoFit/>
-            </a:bodyPr>
-            <a:lstStyle/>
-            <a:p>
-              <a:r>
-                <a:rPr lang="en-US" sz="800" dirty="0"/>
-                <a:t>S4</a:t>
-              </a:r>
-            </a:p>
-          </p:txBody>
-        </p:sp>
-        <p:sp>
-          <p:nvSpPr>
-            <p:cNvPr id="7" name="TextBox 6">
-              <a:extLst>
-                <a:ext uri="{FF2B5EF4-FFF2-40B4-BE49-F238E27FC236}">
-                  <a16:creationId xmlns:a16="http://schemas.microsoft.com/office/drawing/2014/main" id="{B9FE855B-5FFB-D208-EBD7-3FCDC7AEA242}"/>
-                </a:ext>
-              </a:extLst>
-            </p:cNvPr>
-            <p:cNvSpPr txBox="1"/>
-            <p:nvPr/>
-          </p:nvSpPr>
-          <p:spPr>
-            <a:xfrm>
-              <a:off x="4734922" y="781133"/>
-              <a:ext cx="311304" cy="215444"/>
-            </a:xfrm>
-            <a:prstGeom prst="rect">
-              <a:avLst/>
-            </a:prstGeom>
-            <a:noFill/>
-          </p:spPr>
-          <p:txBody>
-            <a:bodyPr wrap="none" rtlCol="0">
-              <a:spAutoFit/>
-            </a:bodyPr>
-            <a:lstStyle/>
-            <a:p>
-              <a:r>
-                <a:rPr lang="en-US" sz="800" dirty="0"/>
-                <a:t>S2</a:t>
-              </a:r>
-            </a:p>
-          </p:txBody>
-        </p:sp>
-        <p:sp>
-          <p:nvSpPr>
-            <p:cNvPr id="8" name="TextBox 7">
-              <a:extLst>
-                <a:ext uri="{FF2B5EF4-FFF2-40B4-BE49-F238E27FC236}">
-                  <a16:creationId xmlns:a16="http://schemas.microsoft.com/office/drawing/2014/main" id="{7C064B0E-888F-F287-563B-081D88F7D1DB}"/>
-                </a:ext>
-              </a:extLst>
-            </p:cNvPr>
-            <p:cNvSpPr txBox="1"/>
-            <p:nvPr/>
-          </p:nvSpPr>
-          <p:spPr>
-            <a:xfrm>
-              <a:off x="4536091" y="788195"/>
-              <a:ext cx="311304" cy="215444"/>
-            </a:xfrm>
-            <a:prstGeom prst="rect">
-              <a:avLst/>
-            </a:prstGeom>
-            <a:noFill/>
-          </p:spPr>
-          <p:txBody>
-            <a:bodyPr wrap="none" rtlCol="0">
-              <a:spAutoFit/>
-            </a:bodyPr>
-            <a:lstStyle/>
-            <a:p>
-              <a:r>
-                <a:rPr lang="en-US" sz="800" dirty="0"/>
-                <a:t>S1</a:t>
-              </a:r>
-            </a:p>
-          </p:txBody>
-        </p:sp>
-        <p:sp>
-          <p:nvSpPr>
-            <p:cNvPr id="9" name="TextBox 8">
-              <a:extLst>
-                <a:ext uri="{FF2B5EF4-FFF2-40B4-BE49-F238E27FC236}">
-                  <a16:creationId xmlns:a16="http://schemas.microsoft.com/office/drawing/2014/main" id="{1A0412A0-BB4D-1CAC-AB0B-CE46DD3A0F1E}"/>
-                </a:ext>
-              </a:extLst>
-            </p:cNvPr>
-            <p:cNvSpPr txBox="1"/>
-            <p:nvPr/>
-          </p:nvSpPr>
-          <p:spPr>
-            <a:xfrm rot="5400000">
-              <a:off x="4268385" y="1111478"/>
-              <a:ext cx="378630" cy="215444"/>
-            </a:xfrm>
-            <a:prstGeom prst="rect">
-              <a:avLst/>
-            </a:prstGeom>
-            <a:noFill/>
-          </p:spPr>
-          <p:txBody>
-            <a:bodyPr wrap="none" rtlCol="0">
-              <a:spAutoFit/>
-            </a:bodyPr>
-            <a:lstStyle/>
-            <a:p>
-              <a:r>
-                <a:rPr lang="en-US" sz="800" dirty="0"/>
-                <a:t>time</a:t>
-              </a:r>
-              <a:endParaRPr lang="en-US" sz="1000" dirty="0"/>
-            </a:p>
-          </p:txBody>
-        </p:sp>
-      </p:grpSp>
+          <a:prstGeom prst="rect">
+            <a:avLst/>
+          </a:prstGeom>
+          <a:noFill/>
+        </p:spPr>
+        <p:txBody>
+          <a:bodyPr wrap="none" rtlCol="0">
+            <a:spAutoFit/>
+          </a:bodyPr>
+          <a:lstStyle/>
+          <a:p>
+            <a:r>
+              <a:rPr lang="en-US" sz="800" dirty="0"/>
+              <a:t>S3</a:t>
+            </a:r>
+          </a:p>
+        </p:txBody>
+      </p:sp>
+      <p:sp>
+        <p:nvSpPr>
+          <p:cNvPr id="6" name="TextBox 5">
+            <a:extLst>
+              <a:ext uri="{FF2B5EF4-FFF2-40B4-BE49-F238E27FC236}">
+                <a16:creationId xmlns:a16="http://schemas.microsoft.com/office/drawing/2014/main" id="{531F2EFA-B603-2FC8-B718-52F34741EC65}"/>
+              </a:ext>
+            </a:extLst>
+          </p:cNvPr>
+          <p:cNvSpPr txBox="1"/>
+          <p:nvPr/>
+        </p:nvSpPr>
+        <p:spPr>
+          <a:xfrm>
+            <a:off x="5146708" y="787189"/>
+            <a:ext cx="311304" cy="215444"/>
+          </a:xfrm>
+          <a:prstGeom prst="rect">
+            <a:avLst/>
+          </a:prstGeom>
+          <a:noFill/>
+        </p:spPr>
+        <p:txBody>
+          <a:bodyPr wrap="none" rtlCol="0">
+            <a:spAutoFit/>
+          </a:bodyPr>
+          <a:lstStyle/>
+          <a:p>
+            <a:r>
+              <a:rPr lang="en-US" sz="800" dirty="0"/>
+              <a:t>S4</a:t>
+            </a:r>
+          </a:p>
+        </p:txBody>
+      </p:sp>
+      <p:sp>
+        <p:nvSpPr>
+          <p:cNvPr id="7" name="TextBox 6">
+            <a:extLst>
+              <a:ext uri="{FF2B5EF4-FFF2-40B4-BE49-F238E27FC236}">
+                <a16:creationId xmlns:a16="http://schemas.microsoft.com/office/drawing/2014/main" id="{B9FE855B-5FFB-D208-EBD7-3FCDC7AEA242}"/>
+              </a:ext>
+            </a:extLst>
+          </p:cNvPr>
+          <p:cNvSpPr txBox="1"/>
+          <p:nvPr/>
+        </p:nvSpPr>
+        <p:spPr>
+          <a:xfrm>
+            <a:off x="4734922" y="781133"/>
+            <a:ext cx="311304" cy="215444"/>
+          </a:xfrm>
+          <a:prstGeom prst="rect">
+            <a:avLst/>
+          </a:prstGeom>
+          <a:noFill/>
+        </p:spPr>
+        <p:txBody>
+          <a:bodyPr wrap="none" rtlCol="0">
+            <a:spAutoFit/>
+          </a:bodyPr>
+          <a:lstStyle/>
+          <a:p>
+            <a:r>
+              <a:rPr lang="en-US" sz="800" dirty="0"/>
+              <a:t>S2</a:t>
+            </a:r>
+          </a:p>
+        </p:txBody>
+      </p:sp>
+      <p:sp>
+        <p:nvSpPr>
+          <p:cNvPr id="8" name="TextBox 7">
+            <a:extLst>
+              <a:ext uri="{FF2B5EF4-FFF2-40B4-BE49-F238E27FC236}">
+                <a16:creationId xmlns:a16="http://schemas.microsoft.com/office/drawing/2014/main" id="{7C064B0E-888F-F287-563B-081D88F7D1DB}"/>
+              </a:ext>
+            </a:extLst>
+          </p:cNvPr>
+          <p:cNvSpPr txBox="1"/>
+          <p:nvPr/>
+        </p:nvSpPr>
+        <p:spPr>
+          <a:xfrm>
+            <a:off x="4536091" y="788195"/>
+            <a:ext cx="311304" cy="215444"/>
+          </a:xfrm>
+          <a:prstGeom prst="rect">
+            <a:avLst/>
+          </a:prstGeom>
+          <a:noFill/>
+        </p:spPr>
+        <p:txBody>
+          <a:bodyPr wrap="none" rtlCol="0">
+            <a:spAutoFit/>
+          </a:bodyPr>
+          <a:lstStyle/>
+          <a:p>
+            <a:r>
+              <a:rPr lang="en-US" sz="800" dirty="0"/>
+              <a:t>S1</a:t>
+            </a:r>
+          </a:p>
+        </p:txBody>
+      </p:sp>
+      <p:sp>
+        <p:nvSpPr>
+          <p:cNvPr id="9" name="TextBox 8">
+            <a:extLst>
+              <a:ext uri="{FF2B5EF4-FFF2-40B4-BE49-F238E27FC236}">
+                <a16:creationId xmlns:a16="http://schemas.microsoft.com/office/drawing/2014/main" id="{1A0412A0-BB4D-1CAC-AB0B-CE46DD3A0F1E}"/>
+              </a:ext>
+            </a:extLst>
+          </p:cNvPr>
+          <p:cNvSpPr txBox="1"/>
+          <p:nvPr/>
+        </p:nvSpPr>
+        <p:spPr>
+          <a:xfrm rot="5400000">
+            <a:off x="4268385" y="1111478"/>
+            <a:ext cx="378630" cy="215444"/>
+          </a:xfrm>
+          <a:prstGeom prst="rect">
+            <a:avLst/>
+          </a:prstGeom>
+          <a:noFill/>
+        </p:spPr>
+        <p:txBody>
+          <a:bodyPr wrap="none" rtlCol="0">
+            <a:spAutoFit/>
+          </a:bodyPr>
+          <a:lstStyle/>
+          <a:p>
+            <a:r>
+              <a:rPr lang="en-US" sz="800" dirty="0"/>
+              <a:t>time</a:t>
+            </a:r>
+            <a:endParaRPr lang="en-US" sz="1000" dirty="0"/>
+          </a:p>
+        </p:txBody>
+      </p:sp>
       <p:graphicFrame>
         <p:nvGraphicFramePr>
           <p:cNvPr id="11" name="Google Shape;150;p8">

</xml_diff>